<commit_message>
update pptx and readme
</commit_message>
<xml_diff>
--- a/React Lifecycle.pptx
+++ b/React Lifecycle.pptx
@@ -287,7 +287,7 @@
           <a:p>
             <a:fld id="{1A737AAA-9FE6-EB48-B34A-8F412D799510}" type="datetimeFigureOut">
               <a:rPr lang="ru-RU" smtClean="0"/>
-              <a:t>16.09.2018</a:t>
+              <a:t>27.09.2018</a:t>
             </a:fld>
             <a:endParaRPr lang="ru-RU"/>
           </a:p>
@@ -460,7 +460,7 @@
           <a:p>
             <a:fld id="{1A737AAA-9FE6-EB48-B34A-8F412D799510}" type="datetimeFigureOut">
               <a:rPr lang="ru-RU" smtClean="0"/>
-              <a:t>16.09.2018</a:t>
+              <a:t>27.09.2018</a:t>
             </a:fld>
             <a:endParaRPr lang="ru-RU"/>
           </a:p>
@@ -643,7 +643,7 @@
           <a:p>
             <a:fld id="{1A737AAA-9FE6-EB48-B34A-8F412D799510}" type="datetimeFigureOut">
               <a:rPr lang="ru-RU" smtClean="0"/>
-              <a:t>16.09.2018</a:t>
+              <a:t>27.09.2018</a:t>
             </a:fld>
             <a:endParaRPr lang="ru-RU"/>
           </a:p>
@@ -816,7 +816,7 @@
           <a:p>
             <a:fld id="{1A737AAA-9FE6-EB48-B34A-8F412D799510}" type="datetimeFigureOut">
               <a:rPr lang="ru-RU" smtClean="0"/>
-              <a:t>16.09.2018</a:t>
+              <a:t>27.09.2018</a:t>
             </a:fld>
             <a:endParaRPr lang="ru-RU"/>
           </a:p>
@@ -1094,7 +1094,7 @@
           <a:p>
             <a:fld id="{1A737AAA-9FE6-EB48-B34A-8F412D799510}" type="datetimeFigureOut">
               <a:rPr lang="ru-RU" smtClean="0"/>
-              <a:t>16.09.2018</a:t>
+              <a:t>27.09.2018</a:t>
             </a:fld>
             <a:endParaRPr lang="ru-RU"/>
           </a:p>
@@ -1309,7 +1309,7 @@
           <a:p>
             <a:fld id="{1A737AAA-9FE6-EB48-B34A-8F412D799510}" type="datetimeFigureOut">
               <a:rPr lang="ru-RU" smtClean="0"/>
-              <a:t>16.09.2018</a:t>
+              <a:t>27.09.2018</a:t>
             </a:fld>
             <a:endParaRPr lang="ru-RU"/>
           </a:p>
@@ -1677,7 +1677,7 @@
           <a:p>
             <a:fld id="{1A737AAA-9FE6-EB48-B34A-8F412D799510}" type="datetimeFigureOut">
               <a:rPr lang="ru-RU" smtClean="0"/>
-              <a:t>16.09.2018</a:t>
+              <a:t>27.09.2018</a:t>
             </a:fld>
             <a:endParaRPr lang="ru-RU"/>
           </a:p>
@@ -1818,7 +1818,7 @@
           <a:p>
             <a:fld id="{1A737AAA-9FE6-EB48-B34A-8F412D799510}" type="datetimeFigureOut">
               <a:rPr lang="ru-RU" smtClean="0"/>
-              <a:t>16.09.2018</a:t>
+              <a:t>27.09.2018</a:t>
             </a:fld>
             <a:endParaRPr lang="ru-RU"/>
           </a:p>
@@ -1931,7 +1931,7 @@
           <a:p>
             <a:fld id="{1A737AAA-9FE6-EB48-B34A-8F412D799510}" type="datetimeFigureOut">
               <a:rPr lang="ru-RU" smtClean="0"/>
-              <a:t>16.09.2018</a:t>
+              <a:t>27.09.2018</a:t>
             </a:fld>
             <a:endParaRPr lang="ru-RU"/>
           </a:p>
@@ -2220,7 +2220,7 @@
           <a:p>
             <a:fld id="{1A737AAA-9FE6-EB48-B34A-8F412D799510}" type="datetimeFigureOut">
               <a:rPr lang="ru-RU" smtClean="0"/>
-              <a:t>16.09.2018</a:t>
+              <a:t>27.09.2018</a:t>
             </a:fld>
             <a:endParaRPr lang="ru-RU"/>
           </a:p>
@@ -2511,7 +2511,7 @@
           <a:p>
             <a:fld id="{1A737AAA-9FE6-EB48-B34A-8F412D799510}" type="datetimeFigureOut">
               <a:rPr lang="ru-RU" smtClean="0"/>
-              <a:t>16.09.2018</a:t>
+              <a:t>27.09.2018</a:t>
             </a:fld>
             <a:endParaRPr lang="ru-RU"/>
           </a:p>
@@ -2727,7 +2727,7 @@
           <a:p>
             <a:fld id="{1A737AAA-9FE6-EB48-B34A-8F412D799510}" type="datetimeFigureOut">
               <a:rPr lang="ru-RU" smtClean="0"/>
-              <a:t>16.09.2018</a:t>
+              <a:t>27.09.2018</a:t>
             </a:fld>
             <a:endParaRPr lang="ru-RU"/>
           </a:p>
@@ -4682,7 +4682,9 @@
           </a:xfrm>
         </p:spPr>
         <p:txBody>
-          <a:bodyPr/>
+          <a:bodyPr>
+            <a:normAutofit fontScale="77500" lnSpcReduction="20000"/>
+          </a:bodyPr>
           <a:lstStyle/>
           <a:p>
             <a:pPr marL="0" indent="0">
@@ -4761,6 +4763,88 @@
               <a:t>UI</a:t>
             </a:r>
             <a:endParaRPr lang="ru-RU" dirty="0"/>
+          </a:p>
+          <a:p>
+            <a:pPr marL="0" indent="0">
+              <a:buNone/>
+            </a:pPr>
+            <a:endParaRPr lang="ru-RU" dirty="0"/>
+          </a:p>
+          <a:p>
+            <a:pPr marL="0" indent="0">
+              <a:buNone/>
+            </a:pPr>
+            <a:r>
+              <a:rPr lang="ru-RU" dirty="0"/>
+              <a:t>Не отлавливает ошибки в:</a:t>
+            </a:r>
+            <a:br>
+              <a:rPr lang="ru-RU" dirty="0"/>
+            </a:br>
+            <a:br>
+              <a:rPr lang="ru-RU" dirty="0"/>
+            </a:br>
+            <a:r>
+              <a:rPr lang="ru-RU" b="1" dirty="0"/>
+              <a:t>- </a:t>
+            </a:r>
+            <a:r>
+              <a:rPr lang="ru-RU" dirty="0"/>
+              <a:t>Обработчики событий (# </a:t>
+            </a:r>
+            <a:r>
+              <a:rPr lang="en" i="1" dirty="0" err="1"/>
+              <a:t>onC</a:t>
+            </a:r>
+            <a:r>
+              <a:rPr lang="en-US" i="1"/>
+              <a:t>l</a:t>
+            </a:r>
+            <a:r>
+              <a:rPr lang="en" i="1"/>
+              <a:t>ick</a:t>
+            </a:r>
+            <a:r>
+              <a:rPr lang="en" dirty="0"/>
+              <a:t>)</a:t>
+            </a:r>
+            <a:br>
+              <a:rPr lang="en" dirty="0"/>
+            </a:br>
+            <a:r>
+              <a:rPr lang="en" b="1" dirty="0"/>
+              <a:t>- </a:t>
+            </a:r>
+            <a:r>
+              <a:rPr lang="ru-RU" dirty="0"/>
+              <a:t>Асинхронный код (# </a:t>
+            </a:r>
+            <a:r>
+              <a:rPr lang="en" dirty="0"/>
+              <a:t>Timeout)</a:t>
+            </a:r>
+            <a:br>
+              <a:rPr lang="en" dirty="0"/>
+            </a:br>
+            <a:r>
+              <a:rPr lang="en" b="1" dirty="0"/>
+              <a:t>- </a:t>
+            </a:r>
+            <a:r>
+              <a:rPr lang="en" dirty="0"/>
+              <a:t>SSR</a:t>
+            </a:r>
+            <a:br>
+              <a:rPr lang="en" dirty="0"/>
+            </a:br>
+            <a:r>
+              <a:rPr lang="en" b="1" dirty="0"/>
+              <a:t>- </a:t>
+            </a:r>
+            <a:r>
+              <a:rPr lang="ru-RU" dirty="0"/>
+              <a:t>Компонент с таким методом не ищет проблемы в самом себе</a:t>
+            </a:r>
           </a:p>
           <a:p>
             <a:endParaRPr lang="ru-RU" dirty="0"/>

</xml_diff>